<commit_message>
Update Lanjutan C++ Pertemuan 2 16092023.pptx
Update
</commit_message>
<xml_diff>
--- a/Pertemuan2/Lanjutan C++ Pertemuan 2 16092023.pptx
+++ b/Pertemuan2/Lanjutan C++ Pertemuan 2 16092023.pptx
@@ -50,6 +50,7 @@
     <p:sldId id="299" r:id="rId44"/>
     <p:sldId id="300" r:id="rId45"/>
     <p:sldId id="301" r:id="rId46"/>
+    <p:sldId id="302" r:id="rId47"/>
   </p:sldIdLst>
   <p:sldSz cx="12192000" cy="6858000"/>
   <p:notesSz cx="6858000" cy="9144000"/>
@@ -10976,6 +10977,171 @@
 </p:sld>
 </file>
 
+<file path=ppt/slides/slide46.xml><?xml version="1.0" encoding="utf-8"?>
+<p:sld xmlns:a="http://schemas.openxmlformats.org/drawingml/2006/main" xmlns:r="http://schemas.openxmlformats.org/officeDocument/2006/relationships" xmlns:p="http://schemas.openxmlformats.org/presentationml/2006/main">
+  <p:cSld>
+    <p:spTree>
+      <p:nvGrpSpPr>
+        <p:cNvPr id="1" name=""/>
+        <p:cNvGrpSpPr/>
+        <p:nvPr/>
+      </p:nvGrpSpPr>
+      <p:grpSpPr>
+        <a:xfrm>
+          <a:off x="0" y="0"/>
+          <a:ext cx="0" cy="0"/>
+          <a:chOff x="0" y="0"/>
+          <a:chExt cx="0" cy="0"/>
+        </a:xfrm>
+      </p:grpSpPr>
+      <p:sp>
+        <p:nvSpPr>
+          <p:cNvPr id="2" name="Title 1">
+            <a:extLst>
+              <a:ext uri="{FF2B5EF4-FFF2-40B4-BE49-F238E27FC236}">
+                <a16:creationId xmlns:a16="http://schemas.microsoft.com/office/drawing/2014/main" id="{3323A00C-DD61-9C1F-84EC-E230FC719E25}"/>
+              </a:ext>
+            </a:extLst>
+          </p:cNvPr>
+          <p:cNvSpPr>
+            <a:spLocks noGrp="1"/>
+          </p:cNvSpPr>
+          <p:nvPr>
+            <p:ph type="title"/>
+          </p:nvPr>
+        </p:nvSpPr>
+        <p:spPr/>
+        <p:txBody>
+          <a:bodyPr/>
+          <a:lstStyle/>
+          <a:p>
+            <a:r>
+              <a:rPr lang="en-US" dirty="0"/>
+              <a:t>Repo </a:t>
+            </a:r>
+            <a:endParaRPr lang="en-ID" dirty="0"/>
+          </a:p>
+        </p:txBody>
+      </p:sp>
+      <p:sp>
+        <p:nvSpPr>
+          <p:cNvPr id="3" name="Content Placeholder 2">
+            <a:extLst>
+              <a:ext uri="{FF2B5EF4-FFF2-40B4-BE49-F238E27FC236}">
+                <a16:creationId xmlns:a16="http://schemas.microsoft.com/office/drawing/2014/main" id="{1719559C-E237-B00C-E0A5-F0A6E2630910}"/>
+              </a:ext>
+            </a:extLst>
+          </p:cNvPr>
+          <p:cNvSpPr>
+            <a:spLocks noGrp="1"/>
+          </p:cNvSpPr>
+          <p:nvPr>
+            <p:ph idx="1"/>
+          </p:nvPr>
+        </p:nvSpPr>
+        <p:spPr/>
+        <p:txBody>
+          <a:bodyPr/>
+          <a:lstStyle/>
+          <a:p>
+            <a:r>
+              <a:rPr lang="en-ID" dirty="0">
+                <a:solidFill>
+                  <a:srgbClr val="0563C1"/>
+                </a:solidFill>
+                <a:hlinkClick r:id="rId2">
+                  <a:extLst>
+                    <a:ext uri="{A12FA001-AC4F-418D-AE19-62706E023703}">
+                      <ahyp:hlinkClr xmlns:ahyp="http://schemas.microsoft.com/office/drawing/2018/hyperlinkcolor" val="tx"/>
+                    </a:ext>
+                  </a:extLst>
+                </a:hlinkClick>
+              </a:rPr>
+              <a:t>Bit.ly/DriveTugas_CPP2023</a:t>
+            </a:r>
+            <a:endParaRPr lang="en-ID" dirty="0">
+              <a:hlinkClick r:id="rId2">
+                <a:extLst>
+                  <a:ext uri="{A12FA001-AC4F-418D-AE19-62706E023703}">
+                    <ahyp:hlinkClr xmlns:ahyp="http://schemas.microsoft.com/office/drawing/2018/hyperlinkcolor" val="tx"/>
+                  </a:ext>
+                </a:extLst>
+              </a:hlinkClick>
+            </a:endParaRPr>
+          </a:p>
+          <a:p>
+            <a:r>
+              <a:rPr lang="en-ID" dirty="0">
+                <a:solidFill>
+                  <a:srgbClr val="0563C1"/>
+                </a:solidFill>
+                <a:hlinkClick r:id="rId2">
+                  <a:extLst>
+                    <a:ext uri="{A12FA001-AC4F-418D-AE19-62706E023703}">
+                      <ahyp:hlinkClr xmlns:ahyp="http://schemas.microsoft.com/office/drawing/2018/hyperlinkcolor" val="tx"/>
+                    </a:ext>
+                  </a:extLst>
+                </a:hlinkClick>
+              </a:rPr>
+              <a:t>https://bit.ly/BinusCPP2023</a:t>
+            </a:r>
+            <a:r>
+              <a:rPr lang="en-ID" dirty="0"/>
+              <a:t> </a:t>
+            </a:r>
+          </a:p>
+          <a:p>
+            <a:pPr lvl="1"/>
+            <a:r>
+              <a:rPr lang="en-ID" dirty="0"/>
+              <a:t>Branch : </a:t>
+            </a:r>
+            <a:r>
+              <a:rPr lang="en-ID" dirty="0" err="1"/>
+              <a:t>Materi</a:t>
+            </a:r>
+            <a:endParaRPr lang="en-ID" dirty="0"/>
+          </a:p>
+          <a:p>
+            <a:pPr lvl="1"/>
+            <a:r>
+              <a:rPr lang="en-ID" dirty="0"/>
+              <a:t>Branch : </a:t>
+            </a:r>
+            <a:r>
+              <a:rPr lang="en-ID" dirty="0" err="1"/>
+              <a:t>Tugas</a:t>
+            </a:r>
+            <a:r>
+              <a:rPr lang="en-ID" dirty="0"/>
+              <a:t> </a:t>
+            </a:r>
+          </a:p>
+          <a:p>
+            <a:pPr lvl="1"/>
+            <a:r>
+              <a:rPr lang="en-ID" dirty="0"/>
+              <a:t>Branch : Sample</a:t>
+            </a:r>
+          </a:p>
+          <a:p>
+            <a:endParaRPr lang="en-ID" dirty="0"/>
+          </a:p>
+        </p:txBody>
+      </p:sp>
+    </p:spTree>
+    <p:extLst>
+      <p:ext uri="{BB962C8B-B14F-4D97-AF65-F5344CB8AC3E}">
+        <p14:creationId xmlns:p14="http://schemas.microsoft.com/office/powerpoint/2010/main" val="3718507050"/>
+      </p:ext>
+    </p:extLst>
+  </p:cSld>
+  <p:clrMapOvr>
+    <a:masterClrMapping/>
+  </p:clrMapOvr>
+</p:sld>
+</file>
+
 <file path=ppt/slides/slide5.xml><?xml version="1.0" encoding="utf-8"?>
 <p:sld xmlns:a="http://schemas.openxmlformats.org/drawingml/2006/main" xmlns:r="http://schemas.openxmlformats.org/officeDocument/2006/relationships" xmlns:p="http://schemas.openxmlformats.org/presentationml/2006/main">
   <p:cSld>

</xml_diff>